<commit_message>
Update notes for Lesson 8 and 9.
</commit_message>
<xml_diff>
--- a/Lesson_8/課堂八.pptx
+++ b/Lesson_8/課堂八.pptx
@@ -222,7 +222,7 @@
           <a:p>
             <a:fld id="{980C4F52-D699-4982-A880-C510A8075703}" type="datetimeFigureOut">
               <a:rPr lang="en-US" smtClean="0"/>
-              <a:t>9/8/2019</a:t>
+              <a:t>7/12/2020</a:t>
             </a:fld>
             <a:endParaRPr lang="en-US"/>
           </a:p>
@@ -573,6 +573,90 @@
 </p:notes>
 </file>
 
+<file path=ppt/notesSlides/notesSlide10.xml><?xml version="1.0" encoding="utf-8"?>
+<p:notes xmlns:a="http://schemas.openxmlformats.org/drawingml/2006/main" xmlns:r="http://schemas.openxmlformats.org/officeDocument/2006/relationships" xmlns:p="http://schemas.openxmlformats.org/presentationml/2006/main">
+  <p:cSld>
+    <p:spTree>
+      <p:nvGrpSpPr>
+        <p:cNvPr id="1" name=""/>
+        <p:cNvGrpSpPr/>
+        <p:nvPr/>
+      </p:nvGrpSpPr>
+      <p:grpSpPr>
+        <a:xfrm>
+          <a:off x="0" y="0"/>
+          <a:ext cx="0" cy="0"/>
+          <a:chOff x="0" y="0"/>
+          <a:chExt cx="0" cy="0"/>
+        </a:xfrm>
+      </p:grpSpPr>
+      <p:sp>
+        <p:nvSpPr>
+          <p:cNvPr id="2" name="Slide Image Placeholder 1"/>
+          <p:cNvSpPr>
+            <a:spLocks noGrp="1" noRot="1" noChangeAspect="1"/>
+          </p:cNvSpPr>
+          <p:nvPr>
+            <p:ph type="sldImg"/>
+          </p:nvPr>
+        </p:nvSpPr>
+        <p:spPr/>
+      </p:sp>
+      <p:sp>
+        <p:nvSpPr>
+          <p:cNvPr id="3" name="Notes Placeholder 2"/>
+          <p:cNvSpPr>
+            <a:spLocks noGrp="1"/>
+          </p:cNvSpPr>
+          <p:nvPr>
+            <p:ph type="body" idx="1"/>
+          </p:nvPr>
+        </p:nvSpPr>
+        <p:spPr/>
+        <p:txBody>
+          <a:bodyPr/>
+          <a:lstStyle/>
+          <a:p>
+            <a:endParaRPr lang="zh-HK" altLang="en-US" dirty="0"/>
+          </a:p>
+        </p:txBody>
+      </p:sp>
+      <p:sp>
+        <p:nvSpPr>
+          <p:cNvPr id="4" name="Slide Number Placeholder 3"/>
+          <p:cNvSpPr>
+            <a:spLocks noGrp="1"/>
+          </p:cNvSpPr>
+          <p:nvPr>
+            <p:ph type="sldNum" sz="quarter" idx="5"/>
+          </p:nvPr>
+        </p:nvSpPr>
+        <p:spPr/>
+        <p:txBody>
+          <a:bodyPr/>
+          <a:lstStyle/>
+          <a:p>
+            <a:fld id="{67006D77-E6B4-41AD-ACD4-846E8E2E7AE8}" type="slidenum">
+              <a:rPr lang="en-US" smtClean="0"/>
+              <a:t>15</a:t>
+            </a:fld>
+            <a:endParaRPr lang="en-US"/>
+          </a:p>
+        </p:txBody>
+      </p:sp>
+    </p:spTree>
+    <p:extLst>
+      <p:ext uri="{BB962C8B-B14F-4D97-AF65-F5344CB8AC3E}">
+        <p14:creationId xmlns:p14="http://schemas.microsoft.com/office/powerpoint/2010/main" val="2762291072"/>
+      </p:ext>
+    </p:extLst>
+  </p:cSld>
+  <p:clrMapOvr>
+    <a:masterClrMapping/>
+  </p:clrMapOvr>
+</p:notes>
+</file>
+
 <file path=ppt/notesSlides/notesSlide2.xml><?xml version="1.0" encoding="utf-8"?>
 <p:notes xmlns:a="http://schemas.openxmlformats.org/drawingml/2006/main" xmlns:r="http://schemas.openxmlformats.org/officeDocument/2006/relationships" xmlns:p="http://schemas.openxmlformats.org/presentationml/2006/main">
   <p:cSld>
@@ -806,7 +890,7 @@
           <a:p>
             <a:fld id="{67006D77-E6B4-41AD-ACD4-846E8E2E7AE8}" type="slidenum">
               <a:rPr lang="en-US" smtClean="0"/>
-              <a:t>7</a:t>
+              <a:t>6</a:t>
             </a:fld>
             <a:endParaRPr lang="en-US"/>
           </a:p>
@@ -815,7 +899,7 @@
     </p:spTree>
     <p:extLst>
       <p:ext uri="{BB962C8B-B14F-4D97-AF65-F5344CB8AC3E}">
-        <p14:creationId xmlns:p14="http://schemas.microsoft.com/office/powerpoint/2010/main" val="4140458207"/>
+        <p14:creationId xmlns:p14="http://schemas.microsoft.com/office/powerpoint/2010/main" val="375292926"/>
       </p:ext>
     </p:extLst>
   </p:cSld>
@@ -890,7 +974,7 @@
           <a:p>
             <a:fld id="{67006D77-E6B4-41AD-ACD4-846E8E2E7AE8}" type="slidenum">
               <a:rPr lang="en-US" smtClean="0"/>
-              <a:t>10</a:t>
+              <a:t>7</a:t>
             </a:fld>
             <a:endParaRPr lang="en-US"/>
           </a:p>
@@ -899,7 +983,7 @@
     </p:spTree>
     <p:extLst>
       <p:ext uri="{BB962C8B-B14F-4D97-AF65-F5344CB8AC3E}">
-        <p14:creationId xmlns:p14="http://schemas.microsoft.com/office/powerpoint/2010/main" val="456653386"/>
+        <p14:creationId xmlns:p14="http://schemas.microsoft.com/office/powerpoint/2010/main" val="4140458207"/>
       </p:ext>
     </p:extLst>
   </p:cSld>
@@ -974,7 +1058,7 @@
           <a:p>
             <a:fld id="{67006D77-E6B4-41AD-ACD4-846E8E2E7AE8}" type="slidenum">
               <a:rPr lang="en-US" smtClean="0"/>
-              <a:t>11</a:t>
+              <a:t>10</a:t>
             </a:fld>
             <a:endParaRPr lang="en-US"/>
           </a:p>
@@ -983,7 +1067,7 @@
     </p:spTree>
     <p:extLst>
       <p:ext uri="{BB962C8B-B14F-4D97-AF65-F5344CB8AC3E}">
-        <p14:creationId xmlns:p14="http://schemas.microsoft.com/office/powerpoint/2010/main" val="2212026153"/>
+        <p14:creationId xmlns:p14="http://schemas.microsoft.com/office/powerpoint/2010/main" val="456653386"/>
       </p:ext>
     </p:extLst>
   </p:cSld>
@@ -1058,7 +1142,7 @@
           <a:p>
             <a:fld id="{67006D77-E6B4-41AD-ACD4-846E8E2E7AE8}" type="slidenum">
               <a:rPr lang="en-US" smtClean="0"/>
-              <a:t>12</a:t>
+              <a:t>11</a:t>
             </a:fld>
             <a:endParaRPr lang="en-US"/>
           </a:p>
@@ -1067,7 +1151,7 @@
     </p:spTree>
     <p:extLst>
       <p:ext uri="{BB962C8B-B14F-4D97-AF65-F5344CB8AC3E}">
-        <p14:creationId xmlns:p14="http://schemas.microsoft.com/office/powerpoint/2010/main" val="1906998195"/>
+        <p14:creationId xmlns:p14="http://schemas.microsoft.com/office/powerpoint/2010/main" val="2212026153"/>
       </p:ext>
     </p:extLst>
   </p:cSld>
@@ -1121,7 +1205,7 @@
           <a:bodyPr/>
           <a:lstStyle/>
           <a:p>
-            <a:endParaRPr lang="en-US" dirty="0"/>
+            <a:endParaRPr lang="zh-HK" altLang="en-US" dirty="0"/>
           </a:p>
         </p:txBody>
       </p:sp>
@@ -1132,7 +1216,7 @@
             <a:spLocks noGrp="1"/>
           </p:cNvSpPr>
           <p:nvPr>
-            <p:ph type="sldNum" sz="quarter" idx="10"/>
+            <p:ph type="sldNum" sz="quarter" idx="5"/>
           </p:nvPr>
         </p:nvSpPr>
         <p:spPr/>
@@ -1142,7 +1226,7 @@
           <a:p>
             <a:fld id="{67006D77-E6B4-41AD-ACD4-846E8E2E7AE8}" type="slidenum">
               <a:rPr lang="en-US" smtClean="0"/>
-              <a:t>14</a:t>
+              <a:t>12</a:t>
             </a:fld>
             <a:endParaRPr lang="en-US"/>
           </a:p>
@@ -1151,7 +1235,7 @@
     </p:spTree>
     <p:extLst>
       <p:ext uri="{BB962C8B-B14F-4D97-AF65-F5344CB8AC3E}">
-        <p14:creationId xmlns:p14="http://schemas.microsoft.com/office/powerpoint/2010/main" val="598843495"/>
+        <p14:creationId xmlns:p14="http://schemas.microsoft.com/office/powerpoint/2010/main" val="1906998195"/>
       </p:ext>
     </p:extLst>
   </p:cSld>
@@ -1205,7 +1289,7 @@
           <a:bodyPr/>
           <a:lstStyle/>
           <a:p>
-            <a:endParaRPr lang="zh-HK" altLang="en-US" dirty="0"/>
+            <a:endParaRPr lang="en-US" dirty="0"/>
           </a:p>
         </p:txBody>
       </p:sp>
@@ -1216,7 +1300,7 @@
             <a:spLocks noGrp="1"/>
           </p:cNvSpPr>
           <p:nvPr>
-            <p:ph type="sldNum" sz="quarter" idx="5"/>
+            <p:ph type="sldNum" sz="quarter" idx="10"/>
           </p:nvPr>
         </p:nvSpPr>
         <p:spPr/>
@@ -1226,7 +1310,7 @@
           <a:p>
             <a:fld id="{67006D77-E6B4-41AD-ACD4-846E8E2E7AE8}" type="slidenum">
               <a:rPr lang="en-US" smtClean="0"/>
-              <a:t>15</a:t>
+              <a:t>14</a:t>
             </a:fld>
             <a:endParaRPr lang="en-US"/>
           </a:p>
@@ -1235,7 +1319,7 @@
     </p:spTree>
     <p:extLst>
       <p:ext uri="{BB962C8B-B14F-4D97-AF65-F5344CB8AC3E}">
-        <p14:creationId xmlns:p14="http://schemas.microsoft.com/office/powerpoint/2010/main" val="2762291072"/>
+        <p14:creationId xmlns:p14="http://schemas.microsoft.com/office/powerpoint/2010/main" val="598843495"/>
       </p:ext>
     </p:extLst>
   </p:cSld>
@@ -1397,7 +1481,7 @@
           <a:p>
             <a:fld id="{6AD6EE87-EBD5-4F12-A48A-63ACA297AC8F}" type="datetimeFigureOut">
               <a:rPr lang="en-US" smtClean="0"/>
-              <a:t>9/8/2019</a:t>
+              <a:t>7/12/2020</a:t>
             </a:fld>
             <a:endParaRPr lang="en-US" dirty="0"/>
           </a:p>
@@ -1650,7 +1734,7 @@
           <a:p>
             <a:fld id="{4CD73815-2707-4475-8F1A-B873CB631BB4}" type="datetimeFigureOut">
               <a:rPr lang="en-US" smtClean="0"/>
-              <a:t>9/8/2019</a:t>
+              <a:t>7/12/2020</a:t>
             </a:fld>
             <a:endParaRPr lang="en-US" dirty="0"/>
           </a:p>
@@ -1830,7 +1914,7 @@
           <a:p>
             <a:fld id="{2A4AFB99-0EAB-4182-AFF8-E214C82A68F6}" type="datetimeFigureOut">
               <a:rPr lang="en-US" smtClean="0"/>
-              <a:t>9/8/2019</a:t>
+              <a:t>7/12/2020</a:t>
             </a:fld>
             <a:endParaRPr lang="en-US" dirty="0"/>
           </a:p>
@@ -2035,7 +2119,7 @@
           <a:p>
             <a:fld id="{A5D3794B-289A-4A80-97D7-111025398D45}" type="datetimeFigureOut">
               <a:rPr lang="en-US" smtClean="0"/>
-              <a:t>9/8/2019</a:t>
+              <a:t>7/12/2020</a:t>
             </a:fld>
             <a:endParaRPr lang="en-US" dirty="0"/>
           </a:p>
@@ -2292,7 +2376,7 @@
           <a:p>
             <a:fld id="{5A61015F-7CC6-4D0A-9D87-873EA4C304CC}" type="datetimeFigureOut">
               <a:rPr lang="en-US" smtClean="0"/>
-              <a:t>9/8/2019</a:t>
+              <a:t>7/12/2020</a:t>
             </a:fld>
             <a:endParaRPr lang="en-US" dirty="0"/>
           </a:p>
@@ -2614,7 +2698,7 @@
           <a:p>
             <a:fld id="{93C6A301-0538-44EC-B09D-202E1042A48B}" type="datetimeFigureOut">
               <a:rPr lang="en-US" smtClean="0"/>
-              <a:t>9/8/2019</a:t>
+              <a:t>7/12/2020</a:t>
             </a:fld>
             <a:endParaRPr lang="en-US" dirty="0"/>
           </a:p>
@@ -3012,7 +3096,7 @@
           <a:p>
             <a:fld id="{D789574A-8875-45EF-8EA2-3CAA0F7ABC4C}" type="datetimeFigureOut">
               <a:rPr lang="en-US" smtClean="0"/>
-              <a:t>9/8/2019</a:t>
+              <a:t>7/12/2020</a:t>
             </a:fld>
             <a:endParaRPr lang="en-US" dirty="0"/>
           </a:p>
@@ -3130,7 +3214,7 @@
           <a:p>
             <a:fld id="{67EF4D4C-5367-4C26-9E2B-D8088D7FCA81}" type="datetimeFigureOut">
               <a:rPr lang="en-US" smtClean="0"/>
-              <a:t>9/8/2019</a:t>
+              <a:t>7/12/2020</a:t>
             </a:fld>
             <a:endParaRPr lang="en-US" dirty="0"/>
           </a:p>
@@ -3225,7 +3309,7 @@
           <a:p>
             <a:fld id="{56E91E96-98B0-4413-9547-46F3504108EF}" type="datetimeFigureOut">
               <a:rPr lang="en-US" smtClean="0"/>
-              <a:t>9/8/2019</a:t>
+              <a:t>7/12/2020</a:t>
             </a:fld>
             <a:endParaRPr lang="en-US" dirty="0"/>
           </a:p>
@@ -3515,7 +3599,7 @@
           <a:p>
             <a:fld id="{05C68B11-C5A8-448C-8CE9-B1A273C79CFC}" type="datetimeFigureOut">
               <a:rPr lang="en-US" smtClean="0"/>
-              <a:t>9/8/2019</a:t>
+              <a:t>7/12/2020</a:t>
             </a:fld>
             <a:endParaRPr lang="en-US" dirty="0"/>
           </a:p>
@@ -3795,7 +3879,7 @@
           <a:p>
             <a:fld id="{C7616CA0-919D-4A49-9C8A-62FDFB3A5183}" type="datetimeFigureOut">
               <a:rPr lang="en-US" smtClean="0"/>
-              <a:t>9/8/2019</a:t>
+              <a:t>7/12/2020</a:t>
             </a:fld>
             <a:endParaRPr lang="en-US" dirty="0"/>
           </a:p>
@@ -4046,7 +4130,7 @@
             <a:fld id="{90298CD5-6C1E-4009-B41F-6DF62E31D3BE}" type="datetimeFigureOut">
               <a:rPr lang="en-US" smtClean="0"/>
               <a:pPr/>
-              <a:t>9/8/2019</a:t>
+              <a:t>7/12/2020</a:t>
             </a:fld>
             <a:endParaRPr lang="en-US" dirty="0"/>
           </a:p>
@@ -5302,6 +5386,10 @@
           <a:bodyPr/>
           <a:lstStyle/>
           <a:p>
+            <a:r>
+              <a:rPr lang="en-US" altLang="zh-TW" dirty="0"/>
+              <a:t>“Misleading” accuracy</a:t>
+            </a:r>
             <a:endParaRPr lang="zh-HK" altLang="en-US" dirty="0"/>
           </a:p>
         </p:txBody>
@@ -5934,7 +6022,11 @@
           <a:bodyPr/>
           <a:lstStyle/>
           <a:p>
-            <a:endParaRPr lang="zh-HK" altLang="en-US"/>
+            <a:r>
+              <a:rPr lang="en-US" altLang="zh-HK" dirty="0"/>
+              <a:t>Evaluation measures</a:t>
+            </a:r>
+            <a:endParaRPr lang="zh-HK" altLang="en-US" dirty="0"/>
           </a:p>
         </p:txBody>
       </p:sp>
@@ -6090,7 +6182,7 @@
           <a:p>
             <a:r>
               <a:rPr lang="en-US" altLang="zh-HK" dirty="0"/>
-              <a:t>Unbalanced data</a:t>
+              <a:t>imbalanced class</a:t>
             </a:r>
             <a:endParaRPr lang="zh-HK" altLang="en-US" dirty="0"/>
           </a:p>
@@ -6120,6 +6212,18 @@
             <a:r>
               <a:rPr lang="en-US" altLang="zh-HK" dirty="0"/>
               <a:t>Re-sampling</a:t>
+            </a:r>
+          </a:p>
+          <a:p>
+            <a:r>
+              <a:rPr lang="en-US" altLang="zh-HK" dirty="0"/>
+              <a:t>Class weighting</a:t>
+            </a:r>
+          </a:p>
+          <a:p>
+            <a:r>
+              <a:rPr lang="en-US" altLang="zh-HK" dirty="0"/>
+              <a:t>SMOTE</a:t>
             </a:r>
             <a:endParaRPr lang="zh-HK" altLang="en-US" dirty="0"/>
           </a:p>
@@ -7543,18 +7647,68 @@
           </p:nvPr>
         </p:nvPicPr>
         <p:blipFill>
-          <a:blip r:embed="rId2"/>
+          <a:blip r:embed="rId3"/>
           <a:stretch>
             <a:fillRect/>
           </a:stretch>
         </p:blipFill>
         <p:spPr>
           <a:xfrm>
-            <a:off x="2266291" y="2286000"/>
+            <a:off x="889554" y="2084832"/>
             <a:ext cx="7235555" cy="4022725"/>
           </a:xfrm>
         </p:spPr>
       </p:pic>
+      <p:sp>
+        <p:nvSpPr>
+          <p:cNvPr id="4" name="TextBox 3">
+            <a:extLst>
+              <a:ext uri="{FF2B5EF4-FFF2-40B4-BE49-F238E27FC236}">
+                <a16:creationId xmlns:a16="http://schemas.microsoft.com/office/drawing/2014/main" id="{E817936A-CCFA-424C-81B7-4DABAF12392A}"/>
+              </a:ext>
+            </a:extLst>
+          </p:cNvPr>
+          <p:cNvSpPr txBox="1"/>
+          <p:nvPr/>
+        </p:nvSpPr>
+        <p:spPr>
+          <a:xfrm>
+            <a:off x="8455630" y="3964460"/>
+            <a:ext cx="3267182" cy="2031325"/>
+          </a:xfrm>
+          <a:prstGeom prst="rect">
+            <a:avLst/>
+          </a:prstGeom>
+          <a:noFill/>
+        </p:spPr>
+        <p:txBody>
+          <a:bodyPr wrap="square" rtlCol="0">
+            <a:spAutoFit/>
+          </a:bodyPr>
+          <a:lstStyle/>
+          <a:p>
+            <a:r>
+              <a:rPr lang="en-US" altLang="zh-HK" dirty="0"/>
+              <a:t>Intend to avoid the possible </a:t>
+            </a:r>
+            <a:r>
+              <a:rPr lang="en-US" altLang="zh-HK" dirty="0">
+                <a:solidFill>
+                  <a:schemeClr val="accent2">
+                    <a:lumMod val="75000"/>
+                  </a:schemeClr>
+                </a:solidFill>
+              </a:rPr>
+              <a:t>bias introduced by relying on any one particular division into test and train components</a:t>
+            </a:r>
+            <a:r>
+              <a:rPr lang="en-US" altLang="zh-HK" dirty="0"/>
+              <a:t>, to partition the original set in several different ways and to compute an average score over the different partitions.</a:t>
+            </a:r>
+            <a:endParaRPr lang="zh-HK" altLang="en-US" dirty="0"/>
+          </a:p>
+        </p:txBody>
+      </p:sp>
     </p:spTree>
     <p:extLst>
       <p:ext uri="{BB962C8B-B14F-4D97-AF65-F5344CB8AC3E}">
@@ -7595,10 +7749,10 @@
       </p:grpSpPr>
       <p:sp>
         <p:nvSpPr>
-          <p:cNvPr id="34" name="Rectangle 29">
+          <p:cNvPr id="41" name="Rectangle 40">
             <a:extLst>
               <a:ext uri="{FF2B5EF4-FFF2-40B4-BE49-F238E27FC236}">
-                <a16:creationId xmlns:a16="http://schemas.microsoft.com/office/drawing/2014/main" id="{BF73E21A-E0BB-47E2-B73B-7B170203FA93}"/>
+                <a16:creationId xmlns:a16="http://schemas.microsoft.com/office/drawing/2014/main" id="{5F9FFE27-C8B3-4D11-A19E-B82B810872E6}"/>
               </a:ext>
               <a:ext uri="{C183D7F6-B498-43B3-948B-1728B52AA6E4}">
                 <adec:decorative xmlns:adec="http://schemas.microsoft.com/office/drawing/2017/decorative" val="1"/>
@@ -7619,13 +7773,13 @@
         <p:spPr>
           <a:xfrm>
             <a:off x="0" y="0"/>
-            <a:ext cx="5468548" cy="6858000"/>
+            <a:ext cx="6095998" cy="6858000"/>
           </a:xfrm>
           <a:prstGeom prst="rect">
             <a:avLst/>
           </a:prstGeom>
           <a:solidFill>
-            <a:schemeClr val="accent2"/>
+            <a:schemeClr val="bg2"/>
           </a:solidFill>
           <a:ln>
             <a:noFill/>
@@ -7674,8 +7828,8 @@
         </p:nvSpPr>
         <p:spPr>
           <a:xfrm>
-            <a:off x="1024129" y="585216"/>
-            <a:ext cx="3779085" cy="1499616"/>
+            <a:off x="1024128" y="459317"/>
+            <a:ext cx="4389120" cy="1749552"/>
           </a:xfrm>
         </p:spPr>
         <p:txBody>
@@ -7685,34 +7839,22 @@
           <a:lstStyle/>
           <a:p>
             <a:r>
-              <a:rPr lang="en-US" altLang="zh-HK" sz="3500" b="1">
-                <a:solidFill>
-                  <a:srgbClr val="FFFFFF"/>
-                </a:solidFill>
-              </a:rPr>
+              <a:rPr lang="en-US" altLang="zh-HK" sz="4400" b="1"/>
               <a:t>Diagnosing bias and variance</a:t>
             </a:r>
             <a:br>
-              <a:rPr lang="en-US" altLang="zh-HK" sz="3500" b="1">
-                <a:solidFill>
-                  <a:srgbClr val="FFFFFF"/>
-                </a:solidFill>
-              </a:rPr>
+              <a:rPr lang="en-US" altLang="zh-HK" sz="4400" b="1"/>
             </a:br>
-            <a:endParaRPr lang="zh-HK" altLang="en-US" sz="3500">
-              <a:solidFill>
-                <a:srgbClr val="FFFFFF"/>
-              </a:solidFill>
-            </a:endParaRPr>
+            <a:endParaRPr lang="zh-HK" altLang="en-US" sz="4400"/>
           </a:p>
         </p:txBody>
       </p:sp>
       <p:cxnSp>
         <p:nvCxnSpPr>
-          <p:cNvPr id="35" name="Straight Connector 31">
+          <p:cNvPr id="43" name="Straight Connector 42">
             <a:extLst>
               <a:ext uri="{FF2B5EF4-FFF2-40B4-BE49-F238E27FC236}">
-                <a16:creationId xmlns:a16="http://schemas.microsoft.com/office/drawing/2014/main" id="{B7487363-5661-4FE4-AE64-1549B5C9A54D}"/>
+                <a16:creationId xmlns:a16="http://schemas.microsoft.com/office/drawing/2014/main" id="{7EB2FB2D-0639-41A5-BE02-A5CEA697B90D}"/>
               </a:ext>
               <a:ext uri="{C183D7F6-B498-43B3-948B-1728B52AA6E4}">
                 <adec:decorative xmlns:adec="http://schemas.microsoft.com/office/drawing/2017/decorative" val="1"/>
@@ -7740,10 +7882,7 @@
           </a:prstGeom>
           <a:ln w="19050">
             <a:solidFill>
-              <a:schemeClr val="accent2">
-                <a:lumMod val="20000"/>
-                <a:lumOff val="80000"/>
-              </a:schemeClr>
+              <a:schemeClr val="accent2"/>
             </a:solidFill>
           </a:ln>
         </p:spPr>
@@ -7780,8 +7919,8 @@
         </p:nvSpPr>
         <p:spPr>
           <a:xfrm>
-            <a:off x="6326185" y="1155843"/>
-            <a:ext cx="5302056" cy="4926458"/>
+            <a:off x="1024129" y="2286000"/>
+            <a:ext cx="4389120" cy="3931920"/>
           </a:xfrm>
         </p:spPr>
         <p:txBody>
@@ -7793,20 +7932,20 @@
             <a:pPr marL="0" indent="0">
               <a:buNone/>
             </a:pPr>
-            <a:endParaRPr lang="en-US" b="1" dirty="0"/>
+            <a:endParaRPr lang="en-US" sz="1800" b="1"/>
           </a:p>
           <a:p>
             <a:pPr marL="0" indent="0">
               <a:buNone/>
             </a:pPr>
-            <a:endParaRPr lang="en-US" b="1" dirty="0"/>
+            <a:endParaRPr lang="en-US" sz="1800" b="1"/>
           </a:p>
           <a:p>
             <a:pPr marL="0" indent="0">
               <a:buNone/>
             </a:pPr>
             <a:r>
-              <a:rPr lang="en-US" b="1" dirty="0"/>
+              <a:rPr lang="en-US" sz="1800" b="1"/>
               <a:t>High bias – Too restricted model</a:t>
             </a:r>
           </a:p>
@@ -7814,14 +7953,14 @@
             <a:pPr marL="0" indent="0">
               <a:buNone/>
             </a:pPr>
-            <a:endParaRPr lang="en-US" b="1" dirty="0"/>
+            <a:endParaRPr lang="en-US" sz="1800" b="1"/>
           </a:p>
           <a:p>
             <a:pPr marL="0" indent="0">
               <a:buNone/>
             </a:pPr>
             <a:r>
-              <a:rPr lang="en-US" b="1" dirty="0"/>
+              <a:rPr lang="en-US" sz="1800" b="1"/>
               <a:t>High variance – Too complicated model</a:t>
             </a:r>
           </a:p>
@@ -7849,8 +7988,8 @@
         </p:blipFill>
         <p:spPr>
           <a:xfrm>
-            <a:off x="762000" y="2219218"/>
-            <a:ext cx="4281055" cy="3692411"/>
+            <a:off x="6386739" y="1254093"/>
+            <a:ext cx="5419241" cy="4674096"/>
           </a:xfrm>
           <a:prstGeom prst="rect">
             <a:avLst/>

</xml_diff>